<commit_message>
01/10 17:00 최성욱 commit
</commit_message>
<xml_diff>
--- a/문서자료/회원관리 페이지 구현.pptx
+++ b/문서자료/회원관리 페이지 구현.pptx
@@ -109,7 +109,7 @@
   </p:defaultTextStyle>
   <p:extLst>
     <p:ext uri="{EFAFB233-063F-42B5-8137-9DF3F51BA10A}">
-      <p15:sldGuideLst xmlns="" xmlns:p15="http://schemas.microsoft.com/office/powerpoint/2012/main">
+      <p15:sldGuideLst xmlns:p15="http://schemas.microsoft.com/office/powerpoint/2012/main" xmlns="">
         <p15:guide id="1" orient="horz" pos="2160" userDrawn="1">
           <p15:clr>
             <a:srgbClr val="A4A3A4"/>
@@ -148,7 +148,7 @@
           <p:cNvPr id="2" name="제목 1">
             <a:extLst>
               <a:ext uri="{FF2B5EF4-FFF2-40B4-BE49-F238E27FC236}">
-                <a16:creationId xmlns="" xmlns:a16="http://schemas.microsoft.com/office/drawing/2014/main" id="{72A32962-3DC0-4AB3-9B46-6257B204DDD7}"/>
+                <a16:creationId xmlns:a16="http://schemas.microsoft.com/office/drawing/2014/main" xmlns="" id="{72A32962-3DC0-4AB3-9B46-6257B204DDD7}"/>
               </a:ext>
             </a:extLst>
           </p:cNvPr>
@@ -185,7 +185,7 @@
           <p:cNvPr id="3" name="부제목 2">
             <a:extLst>
               <a:ext uri="{FF2B5EF4-FFF2-40B4-BE49-F238E27FC236}">
-                <a16:creationId xmlns="" xmlns:a16="http://schemas.microsoft.com/office/drawing/2014/main" id="{67BF844F-B4E2-4809-87ED-A06F69244E48}"/>
+                <a16:creationId xmlns:a16="http://schemas.microsoft.com/office/drawing/2014/main" xmlns="" id="{67BF844F-B4E2-4809-87ED-A06F69244E48}"/>
               </a:ext>
             </a:extLst>
           </p:cNvPr>
@@ -255,7 +255,7 @@
           <p:cNvPr id="4" name="날짜 개체 틀 3">
             <a:extLst>
               <a:ext uri="{FF2B5EF4-FFF2-40B4-BE49-F238E27FC236}">
-                <a16:creationId xmlns="" xmlns:a16="http://schemas.microsoft.com/office/drawing/2014/main" id="{A80C1D9C-BD05-4523-86A3-4FCAAD67E6A7}"/>
+                <a16:creationId xmlns:a16="http://schemas.microsoft.com/office/drawing/2014/main" xmlns="" id="{A80C1D9C-BD05-4523-86A3-4FCAAD67E6A7}"/>
               </a:ext>
             </a:extLst>
           </p:cNvPr>
@@ -284,7 +284,7 @@
           <p:cNvPr id="5" name="바닥글 개체 틀 4">
             <a:extLst>
               <a:ext uri="{FF2B5EF4-FFF2-40B4-BE49-F238E27FC236}">
-                <a16:creationId xmlns="" xmlns:a16="http://schemas.microsoft.com/office/drawing/2014/main" id="{1EA46766-A74E-4964-B7D9-CAE6B1A2349A}"/>
+                <a16:creationId xmlns:a16="http://schemas.microsoft.com/office/drawing/2014/main" xmlns="" id="{1EA46766-A74E-4964-B7D9-CAE6B1A2349A}"/>
               </a:ext>
             </a:extLst>
           </p:cNvPr>
@@ -309,7 +309,7 @@
           <p:cNvPr id="6" name="슬라이드 번호 개체 틀 5">
             <a:extLst>
               <a:ext uri="{FF2B5EF4-FFF2-40B4-BE49-F238E27FC236}">
-                <a16:creationId xmlns="" xmlns:a16="http://schemas.microsoft.com/office/drawing/2014/main" id="{9C3EE35E-4B78-4AF3-98EB-A5B26BF5231D}"/>
+                <a16:creationId xmlns:a16="http://schemas.microsoft.com/office/drawing/2014/main" xmlns="" id="{9C3EE35E-4B78-4AF3-98EB-A5B26BF5231D}"/>
               </a:ext>
             </a:extLst>
           </p:cNvPr>
@@ -368,7 +368,7 @@
           <p:cNvPr id="2" name="제목 1">
             <a:extLst>
               <a:ext uri="{FF2B5EF4-FFF2-40B4-BE49-F238E27FC236}">
-                <a16:creationId xmlns="" xmlns:a16="http://schemas.microsoft.com/office/drawing/2014/main" id="{50098163-22D5-4CB0-8A52-3F7713FC6E53}"/>
+                <a16:creationId xmlns:a16="http://schemas.microsoft.com/office/drawing/2014/main" xmlns="" id="{50098163-22D5-4CB0-8A52-3F7713FC6E53}"/>
               </a:ext>
             </a:extLst>
           </p:cNvPr>
@@ -396,7 +396,7 @@
           <p:cNvPr id="3" name="세로 텍스트 개체 틀 2">
             <a:extLst>
               <a:ext uri="{FF2B5EF4-FFF2-40B4-BE49-F238E27FC236}">
-                <a16:creationId xmlns="" xmlns:a16="http://schemas.microsoft.com/office/drawing/2014/main" id="{D9D523E5-5E4B-4773-9CE9-B513AB0453A3}"/>
+                <a16:creationId xmlns:a16="http://schemas.microsoft.com/office/drawing/2014/main" xmlns="" id="{D9D523E5-5E4B-4773-9CE9-B513AB0453A3}"/>
               </a:ext>
             </a:extLst>
           </p:cNvPr>
@@ -453,7 +453,7 @@
           <p:cNvPr id="4" name="날짜 개체 틀 3">
             <a:extLst>
               <a:ext uri="{FF2B5EF4-FFF2-40B4-BE49-F238E27FC236}">
-                <a16:creationId xmlns="" xmlns:a16="http://schemas.microsoft.com/office/drawing/2014/main" id="{86728DF9-C461-4FAC-A0CF-2E44D7A8291E}"/>
+                <a16:creationId xmlns:a16="http://schemas.microsoft.com/office/drawing/2014/main" xmlns="" id="{86728DF9-C461-4FAC-A0CF-2E44D7A8291E}"/>
               </a:ext>
             </a:extLst>
           </p:cNvPr>
@@ -482,7 +482,7 @@
           <p:cNvPr id="5" name="바닥글 개체 틀 4">
             <a:extLst>
               <a:ext uri="{FF2B5EF4-FFF2-40B4-BE49-F238E27FC236}">
-                <a16:creationId xmlns="" xmlns:a16="http://schemas.microsoft.com/office/drawing/2014/main" id="{2D8A0133-6F5E-4AF0-9FE4-8879B233B98C}"/>
+                <a16:creationId xmlns:a16="http://schemas.microsoft.com/office/drawing/2014/main" xmlns="" id="{2D8A0133-6F5E-4AF0-9FE4-8879B233B98C}"/>
               </a:ext>
             </a:extLst>
           </p:cNvPr>
@@ -507,7 +507,7 @@
           <p:cNvPr id="6" name="슬라이드 번호 개체 틀 5">
             <a:extLst>
               <a:ext uri="{FF2B5EF4-FFF2-40B4-BE49-F238E27FC236}">
-                <a16:creationId xmlns="" xmlns:a16="http://schemas.microsoft.com/office/drawing/2014/main" id="{97EC6DE3-D534-49FE-ABB1-CD646AA2B688}"/>
+                <a16:creationId xmlns:a16="http://schemas.microsoft.com/office/drawing/2014/main" xmlns="" id="{97EC6DE3-D534-49FE-ABB1-CD646AA2B688}"/>
               </a:ext>
             </a:extLst>
           </p:cNvPr>
@@ -566,7 +566,7 @@
           <p:cNvPr id="2" name="세로 제목 1">
             <a:extLst>
               <a:ext uri="{FF2B5EF4-FFF2-40B4-BE49-F238E27FC236}">
-                <a16:creationId xmlns="" xmlns:a16="http://schemas.microsoft.com/office/drawing/2014/main" id="{FD008E72-1F97-4BEA-A8C3-1AF620358529}"/>
+                <a16:creationId xmlns:a16="http://schemas.microsoft.com/office/drawing/2014/main" xmlns="" id="{FD008E72-1F97-4BEA-A8C3-1AF620358529}"/>
               </a:ext>
             </a:extLst>
           </p:cNvPr>
@@ -599,7 +599,7 @@
           <p:cNvPr id="3" name="세로 텍스트 개체 틀 2">
             <a:extLst>
               <a:ext uri="{FF2B5EF4-FFF2-40B4-BE49-F238E27FC236}">
-                <a16:creationId xmlns="" xmlns:a16="http://schemas.microsoft.com/office/drawing/2014/main" id="{6F7C3D95-1159-4ED9-B75A-A3B37A1EB231}"/>
+                <a16:creationId xmlns:a16="http://schemas.microsoft.com/office/drawing/2014/main" xmlns="" id="{6F7C3D95-1159-4ED9-B75A-A3B37A1EB231}"/>
               </a:ext>
             </a:extLst>
           </p:cNvPr>
@@ -661,7 +661,7 @@
           <p:cNvPr id="4" name="날짜 개체 틀 3">
             <a:extLst>
               <a:ext uri="{FF2B5EF4-FFF2-40B4-BE49-F238E27FC236}">
-                <a16:creationId xmlns="" xmlns:a16="http://schemas.microsoft.com/office/drawing/2014/main" id="{70A2385D-6787-4D24-92E7-22BADD006C27}"/>
+                <a16:creationId xmlns:a16="http://schemas.microsoft.com/office/drawing/2014/main" xmlns="" id="{70A2385D-6787-4D24-92E7-22BADD006C27}"/>
               </a:ext>
             </a:extLst>
           </p:cNvPr>
@@ -690,7 +690,7 @@
           <p:cNvPr id="5" name="바닥글 개체 틀 4">
             <a:extLst>
               <a:ext uri="{FF2B5EF4-FFF2-40B4-BE49-F238E27FC236}">
-                <a16:creationId xmlns="" xmlns:a16="http://schemas.microsoft.com/office/drawing/2014/main" id="{BF822A30-7D40-4B46-98A8-C02DF68B5C9A}"/>
+                <a16:creationId xmlns:a16="http://schemas.microsoft.com/office/drawing/2014/main" xmlns="" id="{BF822A30-7D40-4B46-98A8-C02DF68B5C9A}"/>
               </a:ext>
             </a:extLst>
           </p:cNvPr>
@@ -715,7 +715,7 @@
           <p:cNvPr id="6" name="슬라이드 번호 개체 틀 5">
             <a:extLst>
               <a:ext uri="{FF2B5EF4-FFF2-40B4-BE49-F238E27FC236}">
-                <a16:creationId xmlns="" xmlns:a16="http://schemas.microsoft.com/office/drawing/2014/main" id="{7C3FC28D-08F5-423B-A06F-FE1284C324C1}"/>
+                <a16:creationId xmlns:a16="http://schemas.microsoft.com/office/drawing/2014/main" xmlns="" id="{7C3FC28D-08F5-423B-A06F-FE1284C324C1}"/>
               </a:ext>
             </a:extLst>
           </p:cNvPr>
@@ -774,7 +774,7 @@
           <p:cNvPr id="2" name="제목 1">
             <a:extLst>
               <a:ext uri="{FF2B5EF4-FFF2-40B4-BE49-F238E27FC236}">
-                <a16:creationId xmlns="" xmlns:a16="http://schemas.microsoft.com/office/drawing/2014/main" id="{F740F424-2CA6-4DA8-9B8B-87879C269DE0}"/>
+                <a16:creationId xmlns:a16="http://schemas.microsoft.com/office/drawing/2014/main" xmlns="" id="{F740F424-2CA6-4DA8-9B8B-87879C269DE0}"/>
               </a:ext>
             </a:extLst>
           </p:cNvPr>
@@ -802,7 +802,7 @@
           <p:cNvPr id="3" name="내용 개체 틀 2">
             <a:extLst>
               <a:ext uri="{FF2B5EF4-FFF2-40B4-BE49-F238E27FC236}">
-                <a16:creationId xmlns="" xmlns:a16="http://schemas.microsoft.com/office/drawing/2014/main" id="{71310EDE-A7D1-447C-A97D-E97E5D2C3254}"/>
+                <a16:creationId xmlns:a16="http://schemas.microsoft.com/office/drawing/2014/main" xmlns="" id="{71310EDE-A7D1-447C-A97D-E97E5D2C3254}"/>
               </a:ext>
             </a:extLst>
           </p:cNvPr>
@@ -859,7 +859,7 @@
           <p:cNvPr id="4" name="날짜 개체 틀 3">
             <a:extLst>
               <a:ext uri="{FF2B5EF4-FFF2-40B4-BE49-F238E27FC236}">
-                <a16:creationId xmlns="" xmlns:a16="http://schemas.microsoft.com/office/drawing/2014/main" id="{AB26E428-5638-49B9-9774-CCBA900E51BF}"/>
+                <a16:creationId xmlns:a16="http://schemas.microsoft.com/office/drawing/2014/main" xmlns="" id="{AB26E428-5638-49B9-9774-CCBA900E51BF}"/>
               </a:ext>
             </a:extLst>
           </p:cNvPr>
@@ -888,7 +888,7 @@
           <p:cNvPr id="5" name="바닥글 개체 틀 4">
             <a:extLst>
               <a:ext uri="{FF2B5EF4-FFF2-40B4-BE49-F238E27FC236}">
-                <a16:creationId xmlns="" xmlns:a16="http://schemas.microsoft.com/office/drawing/2014/main" id="{0AF82470-CBFE-4CB0-92B8-E25800B055C3}"/>
+                <a16:creationId xmlns:a16="http://schemas.microsoft.com/office/drawing/2014/main" xmlns="" id="{0AF82470-CBFE-4CB0-92B8-E25800B055C3}"/>
               </a:ext>
             </a:extLst>
           </p:cNvPr>
@@ -913,7 +913,7 @@
           <p:cNvPr id="6" name="슬라이드 번호 개체 틀 5">
             <a:extLst>
               <a:ext uri="{FF2B5EF4-FFF2-40B4-BE49-F238E27FC236}">
-                <a16:creationId xmlns="" xmlns:a16="http://schemas.microsoft.com/office/drawing/2014/main" id="{57EDC7B3-30F2-4713-9ED4-DB43F7AEBD46}"/>
+                <a16:creationId xmlns:a16="http://schemas.microsoft.com/office/drawing/2014/main" xmlns="" id="{57EDC7B3-30F2-4713-9ED4-DB43F7AEBD46}"/>
               </a:ext>
             </a:extLst>
           </p:cNvPr>
@@ -972,7 +972,7 @@
           <p:cNvPr id="2" name="제목 1">
             <a:extLst>
               <a:ext uri="{FF2B5EF4-FFF2-40B4-BE49-F238E27FC236}">
-                <a16:creationId xmlns="" xmlns:a16="http://schemas.microsoft.com/office/drawing/2014/main" id="{7D46F288-BC9D-4D1D-BB75-45B9D08703EB}"/>
+                <a16:creationId xmlns:a16="http://schemas.microsoft.com/office/drawing/2014/main" xmlns="" id="{7D46F288-BC9D-4D1D-BB75-45B9D08703EB}"/>
               </a:ext>
             </a:extLst>
           </p:cNvPr>
@@ -1009,7 +1009,7 @@
           <p:cNvPr id="3" name="텍스트 개체 틀 2">
             <a:extLst>
               <a:ext uri="{FF2B5EF4-FFF2-40B4-BE49-F238E27FC236}">
-                <a16:creationId xmlns="" xmlns:a16="http://schemas.microsoft.com/office/drawing/2014/main" id="{0785E322-8CDA-4A8A-9261-04F9E6535649}"/>
+                <a16:creationId xmlns:a16="http://schemas.microsoft.com/office/drawing/2014/main" xmlns="" id="{0785E322-8CDA-4A8A-9261-04F9E6535649}"/>
               </a:ext>
             </a:extLst>
           </p:cNvPr>
@@ -1134,7 +1134,7 @@
           <p:cNvPr id="4" name="날짜 개체 틀 3">
             <a:extLst>
               <a:ext uri="{FF2B5EF4-FFF2-40B4-BE49-F238E27FC236}">
-                <a16:creationId xmlns="" xmlns:a16="http://schemas.microsoft.com/office/drawing/2014/main" id="{5BE618C0-AF03-4E62-9022-9D2B798E9E05}"/>
+                <a16:creationId xmlns:a16="http://schemas.microsoft.com/office/drawing/2014/main" xmlns="" id="{5BE618C0-AF03-4E62-9022-9D2B798E9E05}"/>
               </a:ext>
             </a:extLst>
           </p:cNvPr>
@@ -1163,7 +1163,7 @@
           <p:cNvPr id="5" name="바닥글 개체 틀 4">
             <a:extLst>
               <a:ext uri="{FF2B5EF4-FFF2-40B4-BE49-F238E27FC236}">
-                <a16:creationId xmlns="" xmlns:a16="http://schemas.microsoft.com/office/drawing/2014/main" id="{CA824A3D-E998-4995-856C-F5A504AD7FD9}"/>
+                <a16:creationId xmlns:a16="http://schemas.microsoft.com/office/drawing/2014/main" xmlns="" id="{CA824A3D-E998-4995-856C-F5A504AD7FD9}"/>
               </a:ext>
             </a:extLst>
           </p:cNvPr>
@@ -1188,7 +1188,7 @@
           <p:cNvPr id="6" name="슬라이드 번호 개체 틀 5">
             <a:extLst>
               <a:ext uri="{FF2B5EF4-FFF2-40B4-BE49-F238E27FC236}">
-                <a16:creationId xmlns="" xmlns:a16="http://schemas.microsoft.com/office/drawing/2014/main" id="{AD2BF544-B4FB-42B2-BA8C-E1B3D22F5FFB}"/>
+                <a16:creationId xmlns:a16="http://schemas.microsoft.com/office/drawing/2014/main" xmlns="" id="{AD2BF544-B4FB-42B2-BA8C-E1B3D22F5FFB}"/>
               </a:ext>
             </a:extLst>
           </p:cNvPr>
@@ -1247,7 +1247,7 @@
           <p:cNvPr id="2" name="제목 1">
             <a:extLst>
               <a:ext uri="{FF2B5EF4-FFF2-40B4-BE49-F238E27FC236}">
-                <a16:creationId xmlns="" xmlns:a16="http://schemas.microsoft.com/office/drawing/2014/main" id="{FBB9FCF8-979B-479E-BE85-7DAF0316D3D4}"/>
+                <a16:creationId xmlns:a16="http://schemas.microsoft.com/office/drawing/2014/main" xmlns="" id="{FBB9FCF8-979B-479E-BE85-7DAF0316D3D4}"/>
               </a:ext>
             </a:extLst>
           </p:cNvPr>
@@ -1275,7 +1275,7 @@
           <p:cNvPr id="3" name="내용 개체 틀 2">
             <a:extLst>
               <a:ext uri="{FF2B5EF4-FFF2-40B4-BE49-F238E27FC236}">
-                <a16:creationId xmlns="" xmlns:a16="http://schemas.microsoft.com/office/drawing/2014/main" id="{4140600F-AA06-4F2C-B4DB-AE9F9B077CBF}"/>
+                <a16:creationId xmlns:a16="http://schemas.microsoft.com/office/drawing/2014/main" xmlns="" id="{4140600F-AA06-4F2C-B4DB-AE9F9B077CBF}"/>
               </a:ext>
             </a:extLst>
           </p:cNvPr>
@@ -1337,7 +1337,7 @@
           <p:cNvPr id="4" name="내용 개체 틀 3">
             <a:extLst>
               <a:ext uri="{FF2B5EF4-FFF2-40B4-BE49-F238E27FC236}">
-                <a16:creationId xmlns="" xmlns:a16="http://schemas.microsoft.com/office/drawing/2014/main" id="{3DA5DFD6-D104-40F8-BEDF-0F2A8CBD4F7C}"/>
+                <a16:creationId xmlns:a16="http://schemas.microsoft.com/office/drawing/2014/main" xmlns="" id="{3DA5DFD6-D104-40F8-BEDF-0F2A8CBD4F7C}"/>
               </a:ext>
             </a:extLst>
           </p:cNvPr>
@@ -1399,7 +1399,7 @@
           <p:cNvPr id="5" name="날짜 개체 틀 4">
             <a:extLst>
               <a:ext uri="{FF2B5EF4-FFF2-40B4-BE49-F238E27FC236}">
-                <a16:creationId xmlns="" xmlns:a16="http://schemas.microsoft.com/office/drawing/2014/main" id="{66D962E9-F7E4-4029-88D0-8BDD182B5F9F}"/>
+                <a16:creationId xmlns:a16="http://schemas.microsoft.com/office/drawing/2014/main" xmlns="" id="{66D962E9-F7E4-4029-88D0-8BDD182B5F9F}"/>
               </a:ext>
             </a:extLst>
           </p:cNvPr>
@@ -1428,7 +1428,7 @@
           <p:cNvPr id="6" name="바닥글 개체 틀 5">
             <a:extLst>
               <a:ext uri="{FF2B5EF4-FFF2-40B4-BE49-F238E27FC236}">
-                <a16:creationId xmlns="" xmlns:a16="http://schemas.microsoft.com/office/drawing/2014/main" id="{33DD8496-1AE4-436E-A1AE-A0BCA5097AAD}"/>
+                <a16:creationId xmlns:a16="http://schemas.microsoft.com/office/drawing/2014/main" xmlns="" id="{33DD8496-1AE4-436E-A1AE-A0BCA5097AAD}"/>
               </a:ext>
             </a:extLst>
           </p:cNvPr>
@@ -1453,7 +1453,7 @@
           <p:cNvPr id="7" name="슬라이드 번호 개체 틀 6">
             <a:extLst>
               <a:ext uri="{FF2B5EF4-FFF2-40B4-BE49-F238E27FC236}">
-                <a16:creationId xmlns="" xmlns:a16="http://schemas.microsoft.com/office/drawing/2014/main" id="{BB671BB3-A561-495E-A779-AED3052A79BF}"/>
+                <a16:creationId xmlns:a16="http://schemas.microsoft.com/office/drawing/2014/main" xmlns="" id="{BB671BB3-A561-495E-A779-AED3052A79BF}"/>
               </a:ext>
             </a:extLst>
           </p:cNvPr>
@@ -1512,7 +1512,7 @@
           <p:cNvPr id="2" name="제목 1">
             <a:extLst>
               <a:ext uri="{FF2B5EF4-FFF2-40B4-BE49-F238E27FC236}">
-                <a16:creationId xmlns="" xmlns:a16="http://schemas.microsoft.com/office/drawing/2014/main" id="{9EF83321-9310-4786-9AC8-72A95CD5860F}"/>
+                <a16:creationId xmlns:a16="http://schemas.microsoft.com/office/drawing/2014/main" xmlns="" id="{9EF83321-9310-4786-9AC8-72A95CD5860F}"/>
               </a:ext>
             </a:extLst>
           </p:cNvPr>
@@ -1545,7 +1545,7 @@
           <p:cNvPr id="3" name="텍스트 개체 틀 2">
             <a:extLst>
               <a:ext uri="{FF2B5EF4-FFF2-40B4-BE49-F238E27FC236}">
-                <a16:creationId xmlns="" xmlns:a16="http://schemas.microsoft.com/office/drawing/2014/main" id="{8EB0A1E3-D9D3-4B41-9682-BC99DA9A0FE3}"/>
+                <a16:creationId xmlns:a16="http://schemas.microsoft.com/office/drawing/2014/main" xmlns="" id="{8EB0A1E3-D9D3-4B41-9682-BC99DA9A0FE3}"/>
               </a:ext>
             </a:extLst>
           </p:cNvPr>
@@ -1616,7 +1616,7 @@
           <p:cNvPr id="4" name="내용 개체 틀 3">
             <a:extLst>
               <a:ext uri="{FF2B5EF4-FFF2-40B4-BE49-F238E27FC236}">
-                <a16:creationId xmlns="" xmlns:a16="http://schemas.microsoft.com/office/drawing/2014/main" id="{F6AD3A81-3CCB-4444-B886-A0704AE1ACDE}"/>
+                <a16:creationId xmlns:a16="http://schemas.microsoft.com/office/drawing/2014/main" xmlns="" id="{F6AD3A81-3CCB-4444-B886-A0704AE1ACDE}"/>
               </a:ext>
             </a:extLst>
           </p:cNvPr>
@@ -1678,7 +1678,7 @@
           <p:cNvPr id="5" name="텍스트 개체 틀 4">
             <a:extLst>
               <a:ext uri="{FF2B5EF4-FFF2-40B4-BE49-F238E27FC236}">
-                <a16:creationId xmlns="" xmlns:a16="http://schemas.microsoft.com/office/drawing/2014/main" id="{0B600140-AB46-4B97-ADF1-1896E9C2205A}"/>
+                <a16:creationId xmlns:a16="http://schemas.microsoft.com/office/drawing/2014/main" xmlns="" id="{0B600140-AB46-4B97-ADF1-1896E9C2205A}"/>
               </a:ext>
             </a:extLst>
           </p:cNvPr>
@@ -1749,7 +1749,7 @@
           <p:cNvPr id="6" name="내용 개체 틀 5">
             <a:extLst>
               <a:ext uri="{FF2B5EF4-FFF2-40B4-BE49-F238E27FC236}">
-                <a16:creationId xmlns="" xmlns:a16="http://schemas.microsoft.com/office/drawing/2014/main" id="{548F027A-5AB7-4D28-9110-4A1FB21399FD}"/>
+                <a16:creationId xmlns:a16="http://schemas.microsoft.com/office/drawing/2014/main" xmlns="" id="{548F027A-5AB7-4D28-9110-4A1FB21399FD}"/>
               </a:ext>
             </a:extLst>
           </p:cNvPr>
@@ -1811,7 +1811,7 @@
           <p:cNvPr id="7" name="날짜 개체 틀 6">
             <a:extLst>
               <a:ext uri="{FF2B5EF4-FFF2-40B4-BE49-F238E27FC236}">
-                <a16:creationId xmlns="" xmlns:a16="http://schemas.microsoft.com/office/drawing/2014/main" id="{306F367B-23ED-466F-ADDC-7DAC7266D968}"/>
+                <a16:creationId xmlns:a16="http://schemas.microsoft.com/office/drawing/2014/main" xmlns="" id="{306F367B-23ED-466F-ADDC-7DAC7266D968}"/>
               </a:ext>
             </a:extLst>
           </p:cNvPr>
@@ -1840,7 +1840,7 @@
           <p:cNvPr id="8" name="바닥글 개체 틀 7">
             <a:extLst>
               <a:ext uri="{FF2B5EF4-FFF2-40B4-BE49-F238E27FC236}">
-                <a16:creationId xmlns="" xmlns:a16="http://schemas.microsoft.com/office/drawing/2014/main" id="{BA84D1BB-29DC-4822-B482-193D32CF7618}"/>
+                <a16:creationId xmlns:a16="http://schemas.microsoft.com/office/drawing/2014/main" xmlns="" id="{BA84D1BB-29DC-4822-B482-193D32CF7618}"/>
               </a:ext>
             </a:extLst>
           </p:cNvPr>
@@ -1865,7 +1865,7 @@
           <p:cNvPr id="9" name="슬라이드 번호 개체 틀 8">
             <a:extLst>
               <a:ext uri="{FF2B5EF4-FFF2-40B4-BE49-F238E27FC236}">
-                <a16:creationId xmlns="" xmlns:a16="http://schemas.microsoft.com/office/drawing/2014/main" id="{41407539-B877-4A30-92BD-BB6D091AC9D3}"/>
+                <a16:creationId xmlns:a16="http://schemas.microsoft.com/office/drawing/2014/main" xmlns="" id="{41407539-B877-4A30-92BD-BB6D091AC9D3}"/>
               </a:ext>
             </a:extLst>
           </p:cNvPr>
@@ -1924,7 +1924,7 @@
           <p:cNvPr id="2" name="제목 1">
             <a:extLst>
               <a:ext uri="{FF2B5EF4-FFF2-40B4-BE49-F238E27FC236}">
-                <a16:creationId xmlns="" xmlns:a16="http://schemas.microsoft.com/office/drawing/2014/main" id="{67E6D7D8-3187-4F5F-9F90-1C9A226060FE}"/>
+                <a16:creationId xmlns:a16="http://schemas.microsoft.com/office/drawing/2014/main" xmlns="" id="{67E6D7D8-3187-4F5F-9F90-1C9A226060FE}"/>
               </a:ext>
             </a:extLst>
           </p:cNvPr>
@@ -1952,7 +1952,7 @@
           <p:cNvPr id="3" name="날짜 개체 틀 2">
             <a:extLst>
               <a:ext uri="{FF2B5EF4-FFF2-40B4-BE49-F238E27FC236}">
-                <a16:creationId xmlns="" xmlns:a16="http://schemas.microsoft.com/office/drawing/2014/main" id="{B18D3402-B49A-4CC2-B5F5-FEC8E8159FD0}"/>
+                <a16:creationId xmlns:a16="http://schemas.microsoft.com/office/drawing/2014/main" xmlns="" id="{B18D3402-B49A-4CC2-B5F5-FEC8E8159FD0}"/>
               </a:ext>
             </a:extLst>
           </p:cNvPr>
@@ -1981,7 +1981,7 @@
           <p:cNvPr id="4" name="바닥글 개체 틀 3">
             <a:extLst>
               <a:ext uri="{FF2B5EF4-FFF2-40B4-BE49-F238E27FC236}">
-                <a16:creationId xmlns="" xmlns:a16="http://schemas.microsoft.com/office/drawing/2014/main" id="{0D056B89-79E5-4763-B8D4-871ACB6B85D7}"/>
+                <a16:creationId xmlns:a16="http://schemas.microsoft.com/office/drawing/2014/main" xmlns="" id="{0D056B89-79E5-4763-B8D4-871ACB6B85D7}"/>
               </a:ext>
             </a:extLst>
           </p:cNvPr>
@@ -2006,7 +2006,7 @@
           <p:cNvPr id="5" name="슬라이드 번호 개체 틀 4">
             <a:extLst>
               <a:ext uri="{FF2B5EF4-FFF2-40B4-BE49-F238E27FC236}">
-                <a16:creationId xmlns="" xmlns:a16="http://schemas.microsoft.com/office/drawing/2014/main" id="{45A66EA6-F4C6-4BDF-B462-ECA2A240E86E}"/>
+                <a16:creationId xmlns:a16="http://schemas.microsoft.com/office/drawing/2014/main" xmlns="" id="{45A66EA6-F4C6-4BDF-B462-ECA2A240E86E}"/>
               </a:ext>
             </a:extLst>
           </p:cNvPr>
@@ -2065,7 +2065,7 @@
           <p:cNvPr id="2" name="날짜 개체 틀 1">
             <a:extLst>
               <a:ext uri="{FF2B5EF4-FFF2-40B4-BE49-F238E27FC236}">
-                <a16:creationId xmlns="" xmlns:a16="http://schemas.microsoft.com/office/drawing/2014/main" id="{396DEC57-B3AF-46DB-BFA5-36EA2D18851E}"/>
+                <a16:creationId xmlns:a16="http://schemas.microsoft.com/office/drawing/2014/main" xmlns="" id="{396DEC57-B3AF-46DB-BFA5-36EA2D18851E}"/>
               </a:ext>
             </a:extLst>
           </p:cNvPr>
@@ -2094,7 +2094,7 @@
           <p:cNvPr id="3" name="바닥글 개체 틀 2">
             <a:extLst>
               <a:ext uri="{FF2B5EF4-FFF2-40B4-BE49-F238E27FC236}">
-                <a16:creationId xmlns="" xmlns:a16="http://schemas.microsoft.com/office/drawing/2014/main" id="{9E438C98-B6CB-4423-85F8-68CB4DD201AB}"/>
+                <a16:creationId xmlns:a16="http://schemas.microsoft.com/office/drawing/2014/main" xmlns="" id="{9E438C98-B6CB-4423-85F8-68CB4DD201AB}"/>
               </a:ext>
             </a:extLst>
           </p:cNvPr>
@@ -2119,7 +2119,7 @@
           <p:cNvPr id="4" name="슬라이드 번호 개체 틀 3">
             <a:extLst>
               <a:ext uri="{FF2B5EF4-FFF2-40B4-BE49-F238E27FC236}">
-                <a16:creationId xmlns="" xmlns:a16="http://schemas.microsoft.com/office/drawing/2014/main" id="{C8603FCB-580E-4FB5-A1A2-F9A67AFADE3A}"/>
+                <a16:creationId xmlns:a16="http://schemas.microsoft.com/office/drawing/2014/main" xmlns="" id="{C8603FCB-580E-4FB5-A1A2-F9A67AFADE3A}"/>
               </a:ext>
             </a:extLst>
           </p:cNvPr>
@@ -2178,7 +2178,7 @@
           <p:cNvPr id="2" name="제목 1">
             <a:extLst>
               <a:ext uri="{FF2B5EF4-FFF2-40B4-BE49-F238E27FC236}">
-                <a16:creationId xmlns="" xmlns:a16="http://schemas.microsoft.com/office/drawing/2014/main" id="{07AAA592-F365-48FD-B828-11ECE1D64F78}"/>
+                <a16:creationId xmlns:a16="http://schemas.microsoft.com/office/drawing/2014/main" xmlns="" id="{07AAA592-F365-48FD-B828-11ECE1D64F78}"/>
               </a:ext>
             </a:extLst>
           </p:cNvPr>
@@ -2215,7 +2215,7 @@
           <p:cNvPr id="3" name="내용 개체 틀 2">
             <a:extLst>
               <a:ext uri="{FF2B5EF4-FFF2-40B4-BE49-F238E27FC236}">
-                <a16:creationId xmlns="" xmlns:a16="http://schemas.microsoft.com/office/drawing/2014/main" id="{78297538-A6F3-4865-AC37-86C6C44D156A}"/>
+                <a16:creationId xmlns:a16="http://schemas.microsoft.com/office/drawing/2014/main" xmlns="" id="{78297538-A6F3-4865-AC37-86C6C44D156A}"/>
               </a:ext>
             </a:extLst>
           </p:cNvPr>
@@ -2305,7 +2305,7 @@
           <p:cNvPr id="4" name="텍스트 개체 틀 3">
             <a:extLst>
               <a:ext uri="{FF2B5EF4-FFF2-40B4-BE49-F238E27FC236}">
-                <a16:creationId xmlns="" xmlns:a16="http://schemas.microsoft.com/office/drawing/2014/main" id="{F08125F3-7048-448C-9791-8154FD1E06F4}"/>
+                <a16:creationId xmlns:a16="http://schemas.microsoft.com/office/drawing/2014/main" xmlns="" id="{F08125F3-7048-448C-9791-8154FD1E06F4}"/>
               </a:ext>
             </a:extLst>
           </p:cNvPr>
@@ -2376,7 +2376,7 @@
           <p:cNvPr id="5" name="날짜 개체 틀 4">
             <a:extLst>
               <a:ext uri="{FF2B5EF4-FFF2-40B4-BE49-F238E27FC236}">
-                <a16:creationId xmlns="" xmlns:a16="http://schemas.microsoft.com/office/drawing/2014/main" id="{2AC99925-83DE-4C16-A328-3BFBD92ECE06}"/>
+                <a16:creationId xmlns:a16="http://schemas.microsoft.com/office/drawing/2014/main" xmlns="" id="{2AC99925-83DE-4C16-A328-3BFBD92ECE06}"/>
               </a:ext>
             </a:extLst>
           </p:cNvPr>
@@ -2405,7 +2405,7 @@
           <p:cNvPr id="6" name="바닥글 개체 틀 5">
             <a:extLst>
               <a:ext uri="{FF2B5EF4-FFF2-40B4-BE49-F238E27FC236}">
-                <a16:creationId xmlns="" xmlns:a16="http://schemas.microsoft.com/office/drawing/2014/main" id="{6571AA5B-4C53-4A4B-847B-ECA89631774A}"/>
+                <a16:creationId xmlns:a16="http://schemas.microsoft.com/office/drawing/2014/main" xmlns="" id="{6571AA5B-4C53-4A4B-847B-ECA89631774A}"/>
               </a:ext>
             </a:extLst>
           </p:cNvPr>
@@ -2430,7 +2430,7 @@
           <p:cNvPr id="7" name="슬라이드 번호 개체 틀 6">
             <a:extLst>
               <a:ext uri="{FF2B5EF4-FFF2-40B4-BE49-F238E27FC236}">
-                <a16:creationId xmlns="" xmlns:a16="http://schemas.microsoft.com/office/drawing/2014/main" id="{F0E11ADD-AB9C-48A8-B355-EC6ECBABD3CD}"/>
+                <a16:creationId xmlns:a16="http://schemas.microsoft.com/office/drawing/2014/main" xmlns="" id="{F0E11ADD-AB9C-48A8-B355-EC6ECBABD3CD}"/>
               </a:ext>
             </a:extLst>
           </p:cNvPr>
@@ -2489,7 +2489,7 @@
           <p:cNvPr id="2" name="제목 1">
             <a:extLst>
               <a:ext uri="{FF2B5EF4-FFF2-40B4-BE49-F238E27FC236}">
-                <a16:creationId xmlns="" xmlns:a16="http://schemas.microsoft.com/office/drawing/2014/main" id="{6F2DB5B9-A352-4767-98B5-F4225B666E45}"/>
+                <a16:creationId xmlns:a16="http://schemas.microsoft.com/office/drawing/2014/main" xmlns="" id="{6F2DB5B9-A352-4767-98B5-F4225B666E45}"/>
               </a:ext>
             </a:extLst>
           </p:cNvPr>
@@ -2526,7 +2526,7 @@
           <p:cNvPr id="3" name="그림 개체 틀 2">
             <a:extLst>
               <a:ext uri="{FF2B5EF4-FFF2-40B4-BE49-F238E27FC236}">
-                <a16:creationId xmlns="" xmlns:a16="http://schemas.microsoft.com/office/drawing/2014/main" id="{6A72F341-1C3B-4B73-8CDC-297C45B8772A}"/>
+                <a16:creationId xmlns:a16="http://schemas.microsoft.com/office/drawing/2014/main" xmlns="" id="{6A72F341-1C3B-4B73-8CDC-297C45B8772A}"/>
               </a:ext>
             </a:extLst>
           </p:cNvPr>
@@ -2593,7 +2593,7 @@
           <p:cNvPr id="4" name="텍스트 개체 틀 3">
             <a:extLst>
               <a:ext uri="{FF2B5EF4-FFF2-40B4-BE49-F238E27FC236}">
-                <a16:creationId xmlns="" xmlns:a16="http://schemas.microsoft.com/office/drawing/2014/main" id="{EA605F3B-0BC8-4D1F-B0ED-69F4005E16C2}"/>
+                <a16:creationId xmlns:a16="http://schemas.microsoft.com/office/drawing/2014/main" xmlns="" id="{EA605F3B-0BC8-4D1F-B0ED-69F4005E16C2}"/>
               </a:ext>
             </a:extLst>
           </p:cNvPr>
@@ -2664,7 +2664,7 @@
           <p:cNvPr id="5" name="날짜 개체 틀 4">
             <a:extLst>
               <a:ext uri="{FF2B5EF4-FFF2-40B4-BE49-F238E27FC236}">
-                <a16:creationId xmlns="" xmlns:a16="http://schemas.microsoft.com/office/drawing/2014/main" id="{AA4AE304-0BE9-4ED4-B433-1886A0B8581C}"/>
+                <a16:creationId xmlns:a16="http://schemas.microsoft.com/office/drawing/2014/main" xmlns="" id="{AA4AE304-0BE9-4ED4-B433-1886A0B8581C}"/>
               </a:ext>
             </a:extLst>
           </p:cNvPr>
@@ -2693,7 +2693,7 @@
           <p:cNvPr id="6" name="바닥글 개체 틀 5">
             <a:extLst>
               <a:ext uri="{FF2B5EF4-FFF2-40B4-BE49-F238E27FC236}">
-                <a16:creationId xmlns="" xmlns:a16="http://schemas.microsoft.com/office/drawing/2014/main" id="{60D77D46-C234-4530-A875-8C4ADE69775B}"/>
+                <a16:creationId xmlns:a16="http://schemas.microsoft.com/office/drawing/2014/main" xmlns="" id="{60D77D46-C234-4530-A875-8C4ADE69775B}"/>
               </a:ext>
             </a:extLst>
           </p:cNvPr>
@@ -2718,7 +2718,7 @@
           <p:cNvPr id="7" name="슬라이드 번호 개체 틀 6">
             <a:extLst>
               <a:ext uri="{FF2B5EF4-FFF2-40B4-BE49-F238E27FC236}">
-                <a16:creationId xmlns="" xmlns:a16="http://schemas.microsoft.com/office/drawing/2014/main" id="{E67EAF13-ED92-4192-90FF-D627DC6BC1A9}"/>
+                <a16:creationId xmlns:a16="http://schemas.microsoft.com/office/drawing/2014/main" xmlns="" id="{E67EAF13-ED92-4192-90FF-D627DC6BC1A9}"/>
               </a:ext>
             </a:extLst>
           </p:cNvPr>
@@ -2782,7 +2782,7 @@
           <p:cNvPr id="2" name="제목 개체 틀 1">
             <a:extLst>
               <a:ext uri="{FF2B5EF4-FFF2-40B4-BE49-F238E27FC236}">
-                <a16:creationId xmlns="" xmlns:a16="http://schemas.microsoft.com/office/drawing/2014/main" id="{CC4F54F6-94F6-4419-AF5F-FF49FB4AD5CA}"/>
+                <a16:creationId xmlns:a16="http://schemas.microsoft.com/office/drawing/2014/main" xmlns="" id="{CC4F54F6-94F6-4419-AF5F-FF49FB4AD5CA}"/>
               </a:ext>
             </a:extLst>
           </p:cNvPr>
@@ -2820,7 +2820,7 @@
           <p:cNvPr id="3" name="텍스트 개체 틀 2">
             <a:extLst>
               <a:ext uri="{FF2B5EF4-FFF2-40B4-BE49-F238E27FC236}">
-                <a16:creationId xmlns="" xmlns:a16="http://schemas.microsoft.com/office/drawing/2014/main" id="{0680FA24-194E-4FA5-A893-A0E7664A4313}"/>
+                <a16:creationId xmlns:a16="http://schemas.microsoft.com/office/drawing/2014/main" xmlns="" id="{0680FA24-194E-4FA5-A893-A0E7664A4313}"/>
               </a:ext>
             </a:extLst>
           </p:cNvPr>
@@ -2887,7 +2887,7 @@
           <p:cNvPr id="4" name="날짜 개체 틀 3">
             <a:extLst>
               <a:ext uri="{FF2B5EF4-FFF2-40B4-BE49-F238E27FC236}">
-                <a16:creationId xmlns="" xmlns:a16="http://schemas.microsoft.com/office/drawing/2014/main" id="{713450FB-0A4F-4DD7-80ED-A9277E3E06BB}"/>
+                <a16:creationId xmlns:a16="http://schemas.microsoft.com/office/drawing/2014/main" xmlns="" id="{713450FB-0A4F-4DD7-80ED-A9277E3E06BB}"/>
               </a:ext>
             </a:extLst>
           </p:cNvPr>
@@ -2934,7 +2934,7 @@
           <p:cNvPr id="5" name="바닥글 개체 틀 4">
             <a:extLst>
               <a:ext uri="{FF2B5EF4-FFF2-40B4-BE49-F238E27FC236}">
-                <a16:creationId xmlns="" xmlns:a16="http://schemas.microsoft.com/office/drawing/2014/main" id="{21DE52B6-A06C-496C-ABA2-CC90B929B7CD}"/>
+                <a16:creationId xmlns:a16="http://schemas.microsoft.com/office/drawing/2014/main" xmlns="" id="{21DE52B6-A06C-496C-ABA2-CC90B929B7CD}"/>
               </a:ext>
             </a:extLst>
           </p:cNvPr>
@@ -2977,7 +2977,7 @@
           <p:cNvPr id="6" name="슬라이드 번호 개체 틀 5">
             <a:extLst>
               <a:ext uri="{FF2B5EF4-FFF2-40B4-BE49-F238E27FC236}">
-                <a16:creationId xmlns="" xmlns:a16="http://schemas.microsoft.com/office/drawing/2014/main" id="{1069289A-4DC1-46D0-87F6-CE6B3C7BBB9C}"/>
+                <a16:creationId xmlns:a16="http://schemas.microsoft.com/office/drawing/2014/main" xmlns="" id="{1069289A-4DC1-46D0-87F6-CE6B3C7BBB9C}"/>
               </a:ext>
             </a:extLst>
           </p:cNvPr>
@@ -3345,7 +3345,7 @@
           <p:cNvPr id="2" name="제목 1">
             <a:extLst>
               <a:ext uri="{FF2B5EF4-FFF2-40B4-BE49-F238E27FC236}">
-                <a16:creationId xmlns="" xmlns:a16="http://schemas.microsoft.com/office/drawing/2014/main" id="{EDEBC2F3-057A-43B9-B378-60D5D7819F83}"/>
+                <a16:creationId xmlns:a16="http://schemas.microsoft.com/office/drawing/2014/main" xmlns="" id="{EDEBC2F3-057A-43B9-B378-60D5D7819F83}"/>
               </a:ext>
             </a:extLst>
           </p:cNvPr>
@@ -3370,7 +3370,7 @@
           <p:cNvPr id="3" name="부제목 2">
             <a:extLst>
               <a:ext uri="{FF2B5EF4-FFF2-40B4-BE49-F238E27FC236}">
-                <a16:creationId xmlns="" xmlns:a16="http://schemas.microsoft.com/office/drawing/2014/main" id="{5EC7F512-7F2D-4D3B-BA01-2E8D52280313}"/>
+                <a16:creationId xmlns:a16="http://schemas.microsoft.com/office/drawing/2014/main" xmlns="" id="{5EC7F512-7F2D-4D3B-BA01-2E8D52280313}"/>
               </a:ext>
             </a:extLst>
           </p:cNvPr>
@@ -3395,7 +3395,7 @@
           <p:cNvPr id="4" name="Picture 1" descr="파란색 빛망울이 있는 추상적 배경">
             <a:extLst>
               <a:ext uri="{FF2B5EF4-FFF2-40B4-BE49-F238E27FC236}">
-                <a16:creationId xmlns="" xmlns:a16="http://schemas.microsoft.com/office/drawing/2014/main" id="{E8F57FAC-0DCF-4D9D-9EAA-057EA4972273}"/>
+                <a16:creationId xmlns:a16="http://schemas.microsoft.com/office/drawing/2014/main" xmlns="" id="{E8F57FAC-0DCF-4D9D-9EAA-057EA4972273}"/>
               </a:ext>
             </a:extLst>
           </p:cNvPr>
@@ -3424,7 +3424,7 @@
           <p:cNvPr id="6" name="TextBox 5">
             <a:extLst>
               <a:ext uri="{FF2B5EF4-FFF2-40B4-BE49-F238E27FC236}">
-                <a16:creationId xmlns="" xmlns:a16="http://schemas.microsoft.com/office/drawing/2014/main" id="{04F1A2B6-F15B-4250-AB90-1E272ECFD54E}"/>
+                <a16:creationId xmlns:a16="http://schemas.microsoft.com/office/drawing/2014/main" xmlns="" id="{04F1A2B6-F15B-4250-AB90-1E272ECFD54E}"/>
               </a:ext>
             </a:extLst>
           </p:cNvPr>
@@ -3602,7 +3602,7 @@
           <p:cNvPr id="3" name="TextBox 2">
             <a:extLst>
               <a:ext uri="{FF2B5EF4-FFF2-40B4-BE49-F238E27FC236}">
-                <a16:creationId xmlns="" xmlns:a16="http://schemas.microsoft.com/office/drawing/2014/main" id="{356EC186-17D9-4BEC-890F-EAC0F47EDA23}"/>
+                <a16:creationId xmlns:a16="http://schemas.microsoft.com/office/drawing/2014/main" xmlns="" id="{356EC186-17D9-4BEC-890F-EAC0F47EDA23}"/>
               </a:ext>
             </a:extLst>
           </p:cNvPr>
@@ -4282,7 +4282,7 @@
           <p:cNvPr id="4" name="TextBox 3">
             <a:extLst>
               <a:ext uri="{FF2B5EF4-FFF2-40B4-BE49-F238E27FC236}">
-                <a16:creationId xmlns="" xmlns:a16="http://schemas.microsoft.com/office/drawing/2014/main" id="{C1BFDB7A-63B2-437B-81F4-358CD6C55B82}"/>
+                <a16:creationId xmlns:a16="http://schemas.microsoft.com/office/drawing/2014/main" xmlns="" id="{C1BFDB7A-63B2-437B-81F4-358CD6C55B82}"/>
               </a:ext>
             </a:extLst>
           </p:cNvPr>
@@ -4366,7 +4366,7 @@
           <p:cNvPr id="5" name="TextBox 4">
             <a:extLst>
               <a:ext uri="{FF2B5EF4-FFF2-40B4-BE49-F238E27FC236}">
-                <a16:creationId xmlns="" xmlns:a16="http://schemas.microsoft.com/office/drawing/2014/main" id="{06E237F7-264D-43E8-8ABB-A3402F904B03}"/>
+                <a16:creationId xmlns:a16="http://schemas.microsoft.com/office/drawing/2014/main" xmlns="" id="{06E237F7-264D-43E8-8ABB-A3402F904B03}"/>
               </a:ext>
             </a:extLst>
           </p:cNvPr>
@@ -4376,7 +4376,7 @@
         <p:spPr>
           <a:xfrm>
             <a:off x="6096000" y="477487"/>
-            <a:ext cx="4758813" cy="1883593"/>
+            <a:ext cx="4758813" cy="1920526"/>
           </a:xfrm>
           <a:prstGeom prst="rect">
             <a:avLst/>
@@ -4506,14 +4506,14 @@
               <a:t> </a:t>
             </a:r>
             <a:r>
-              <a:rPr lang="en-US" altLang="ko-KR" b="1" kern="0" dirty="0" err="1">
-                <a:solidFill>
-                  <a:schemeClr val="bg1"/>
-                </a:solidFill>
-                <a:latin typeface="돋움" panose="020B0600000101010101" pitchFamily="50" charset="-127"/>
-                <a:ea typeface="돋움" panose="020B0600000101010101" pitchFamily="50" charset="-127"/>
-              </a:rPr>
-              <a:t>s_member</a:t>
+              <a:rPr lang="en-US" altLang="ko-KR" b="1" kern="0" dirty="0" smtClean="0">
+                <a:solidFill>
+                  <a:schemeClr val="bg1"/>
+                </a:solidFill>
+                <a:latin typeface="돋움" panose="020B0600000101010101" pitchFamily="50" charset="-127"/>
+                <a:ea typeface="돋움" panose="020B0600000101010101" pitchFamily="50" charset="-127"/>
+              </a:rPr>
+              <a:t>member </a:t>
             </a:r>
             <a:r>
               <a:rPr lang="en-US" altLang="ko-KR" b="1" kern="0" dirty="0">
@@ -4523,7 +4523,7 @@
                 <a:latin typeface="돋움" panose="020B0600000101010101" pitchFamily="50" charset="-127"/>
                 <a:ea typeface="돋움" panose="020B0600000101010101" pitchFamily="50" charset="-127"/>
               </a:rPr>
-              <a:t> (id, name, pw)</a:t>
+              <a:t>(id, name, pw)</a:t>
             </a:r>
           </a:p>
           <a:p>
@@ -4689,14 +4689,14 @@
               <a:t> </a:t>
             </a:r>
             <a:r>
-              <a:rPr lang="en-US" altLang="ko-KR" b="1" kern="0" dirty="0" err="1">
-                <a:solidFill>
-                  <a:schemeClr val="bg1"/>
-                </a:solidFill>
-                <a:latin typeface="돋움" panose="020B0600000101010101" pitchFamily="50" charset="-127"/>
-                <a:ea typeface="돋움" panose="020B0600000101010101" pitchFamily="50" charset="-127"/>
-              </a:rPr>
-              <a:t>s_member</a:t>
+              <a:rPr lang="en-US" altLang="ko-KR" b="1" kern="0" dirty="0" smtClean="0">
+                <a:solidFill>
+                  <a:schemeClr val="bg1"/>
+                </a:solidFill>
+                <a:latin typeface="돋움" panose="020B0600000101010101" pitchFamily="50" charset="-127"/>
+                <a:ea typeface="돋움" panose="020B0600000101010101" pitchFamily="50" charset="-127"/>
+              </a:rPr>
+              <a:t>member </a:t>
             </a:r>
             <a:r>
               <a:rPr lang="en-US" altLang="ko-KR" b="1" kern="0" dirty="0">
@@ -4706,7 +4706,7 @@
                 <a:latin typeface="돋움" panose="020B0600000101010101" pitchFamily="50" charset="-127"/>
                 <a:ea typeface="돋움" panose="020B0600000101010101" pitchFamily="50" charset="-127"/>
               </a:rPr>
-              <a:t> (id, name, pw)</a:t>
+              <a:t>(id, name, pw)</a:t>
             </a:r>
           </a:p>
           <a:p>
@@ -4791,7 +4791,7 @@
           <p:cNvPr id="6" name="TextBox 5">
             <a:extLst>
               <a:ext uri="{FF2B5EF4-FFF2-40B4-BE49-F238E27FC236}">
-                <a16:creationId xmlns="" xmlns:a16="http://schemas.microsoft.com/office/drawing/2014/main" id="{FEE6E087-8A7E-4EFF-914A-BA5EF9489250}"/>
+                <a16:creationId xmlns:a16="http://schemas.microsoft.com/office/drawing/2014/main" xmlns="" id="{FEE6E087-8A7E-4EFF-914A-BA5EF9489250}"/>
               </a:ext>
             </a:extLst>
           </p:cNvPr>
@@ -4801,7 +4801,7 @@
         <p:spPr>
           <a:xfrm>
             <a:off x="6096000" y="3429000"/>
-            <a:ext cx="4758813" cy="1883593"/>
+            <a:ext cx="4758813" cy="1920526"/>
           </a:xfrm>
           <a:prstGeom prst="rect">
             <a:avLst/>
@@ -4931,14 +4931,14 @@
               <a:t> </a:t>
             </a:r>
             <a:r>
-              <a:rPr lang="en-US" altLang="ko-KR" b="1" kern="0" dirty="0" err="1">
-                <a:solidFill>
-                  <a:schemeClr val="bg1"/>
-                </a:solidFill>
-                <a:latin typeface="돋움" panose="020B0600000101010101" pitchFamily="50" charset="-127"/>
-                <a:ea typeface="돋움" panose="020B0600000101010101" pitchFamily="50" charset="-127"/>
-              </a:rPr>
-              <a:t>s_member</a:t>
+              <a:rPr lang="en-US" altLang="ko-KR" b="1" kern="0" dirty="0" smtClean="0">
+                <a:solidFill>
+                  <a:schemeClr val="bg1"/>
+                </a:solidFill>
+                <a:latin typeface="돋움" panose="020B0600000101010101" pitchFamily="50" charset="-127"/>
+                <a:ea typeface="돋움" panose="020B0600000101010101" pitchFamily="50" charset="-127"/>
+              </a:rPr>
+              <a:t>member </a:t>
             </a:r>
             <a:r>
               <a:rPr lang="en-US" altLang="ko-KR" b="1" kern="0" dirty="0">
@@ -4948,7 +4948,7 @@
                 <a:latin typeface="돋움" panose="020B0600000101010101" pitchFamily="50" charset="-127"/>
                 <a:ea typeface="돋움" panose="020B0600000101010101" pitchFamily="50" charset="-127"/>
               </a:rPr>
-              <a:t> (id, name, pw)</a:t>
+              <a:t>(id, name, pw)</a:t>
             </a:r>
           </a:p>
           <a:p>
@@ -5114,14 +5114,14 @@
               <a:t> </a:t>
             </a:r>
             <a:r>
-              <a:rPr lang="en-US" altLang="ko-KR" b="1" kern="0" dirty="0" err="1">
-                <a:solidFill>
-                  <a:schemeClr val="bg1"/>
-                </a:solidFill>
-                <a:latin typeface="돋움" panose="020B0600000101010101" pitchFamily="50" charset="-127"/>
-                <a:ea typeface="돋움" panose="020B0600000101010101" pitchFamily="50" charset="-127"/>
-              </a:rPr>
-              <a:t>s_member</a:t>
+              <a:rPr lang="en-US" altLang="ko-KR" b="1" kern="0" dirty="0" smtClean="0">
+                <a:solidFill>
+                  <a:schemeClr val="bg1"/>
+                </a:solidFill>
+                <a:latin typeface="돋움" panose="020B0600000101010101" pitchFamily="50" charset="-127"/>
+                <a:ea typeface="돋움" panose="020B0600000101010101" pitchFamily="50" charset="-127"/>
+              </a:rPr>
+              <a:t>member </a:t>
             </a:r>
             <a:r>
               <a:rPr lang="en-US" altLang="ko-KR" b="1" kern="0" dirty="0">
@@ -5131,7 +5131,7 @@
                 <a:latin typeface="돋움" panose="020B0600000101010101" pitchFamily="50" charset="-127"/>
                 <a:ea typeface="돋움" panose="020B0600000101010101" pitchFamily="50" charset="-127"/>
               </a:rPr>
-              <a:t> (id, name, pw)</a:t>
+              <a:t>(id, name, pw)</a:t>
             </a:r>
           </a:p>
           <a:p>
@@ -5254,7 +5254,7 @@
           <p:cNvPr id="1026" name="Picture 2" descr="줄다리기. 남자와 여자는 밧줄을 당겨. 로열티 무료 사진, 그림, 이미지 그리고 스톡포토그래피. Image 81127846.">
             <a:extLst>
               <a:ext uri="{FF2B5EF4-FFF2-40B4-BE49-F238E27FC236}">
-                <a16:creationId xmlns="" xmlns:a16="http://schemas.microsoft.com/office/drawing/2014/main" id="{7600B920-940F-44C5-AD10-19A360BA3349}"/>
+                <a16:creationId xmlns:a16="http://schemas.microsoft.com/office/drawing/2014/main" xmlns="" id="{7600B920-940F-44C5-AD10-19A360BA3349}"/>
               </a:ext>
             </a:extLst>
           </p:cNvPr>
@@ -5413,7 +5413,7 @@
           <p:cNvPr id="3" name="TextBox 2">
             <a:extLst>
               <a:ext uri="{FF2B5EF4-FFF2-40B4-BE49-F238E27FC236}">
-                <a16:creationId xmlns="" xmlns:a16="http://schemas.microsoft.com/office/drawing/2014/main" id="{356EC186-17D9-4BEC-890F-EAC0F47EDA23}"/>
+                <a16:creationId xmlns:a16="http://schemas.microsoft.com/office/drawing/2014/main" xmlns="" id="{356EC186-17D9-4BEC-890F-EAC0F47EDA23}"/>
               </a:ext>
             </a:extLst>
           </p:cNvPr>
@@ -5854,7 +5854,7 @@
           <p:cNvPr id="4" name="TextBox 3">
             <a:extLst>
               <a:ext uri="{FF2B5EF4-FFF2-40B4-BE49-F238E27FC236}">
-                <a16:creationId xmlns="" xmlns:a16="http://schemas.microsoft.com/office/drawing/2014/main" id="{C1BFDB7A-63B2-437B-81F4-358CD6C55B82}"/>
+                <a16:creationId xmlns:a16="http://schemas.microsoft.com/office/drawing/2014/main" xmlns="" id="{C1BFDB7A-63B2-437B-81F4-358CD6C55B82}"/>
               </a:ext>
             </a:extLst>
           </p:cNvPr>
@@ -5940,7 +5940,7 @@
           <p:cNvPr id="5" name="TextBox 4">
             <a:extLst>
               <a:ext uri="{FF2B5EF4-FFF2-40B4-BE49-F238E27FC236}">
-                <a16:creationId xmlns="" xmlns:a16="http://schemas.microsoft.com/office/drawing/2014/main" id="{06E237F7-264D-43E8-8ABB-A3402F904B03}"/>
+                <a16:creationId xmlns:a16="http://schemas.microsoft.com/office/drawing/2014/main" xmlns="" id="{06E237F7-264D-43E8-8ABB-A3402F904B03}"/>
               </a:ext>
             </a:extLst>
           </p:cNvPr>
@@ -6153,7 +6153,7 @@
           <p:cNvPr id="7" name="TextBox 6">
             <a:extLst>
               <a:ext uri="{FF2B5EF4-FFF2-40B4-BE49-F238E27FC236}">
-                <a16:creationId xmlns="" xmlns:a16="http://schemas.microsoft.com/office/drawing/2014/main" id="{9E7C7E76-D21F-4021-9203-85C04C2D5986}"/>
+                <a16:creationId xmlns:a16="http://schemas.microsoft.com/office/drawing/2014/main" xmlns="" id="{9E7C7E76-D21F-4021-9203-85C04C2D5986}"/>
               </a:ext>
             </a:extLst>
           </p:cNvPr>
@@ -6719,7 +6719,7 @@
           <p:cNvPr id="2" name="타원 1">
             <a:extLst>
               <a:ext uri="{FF2B5EF4-FFF2-40B4-BE49-F238E27FC236}">
-                <a16:creationId xmlns="" xmlns:a16="http://schemas.microsoft.com/office/drawing/2014/main" id="{E5632C1D-A950-4F3E-9CF5-79F67973BD57}"/>
+                <a16:creationId xmlns:a16="http://schemas.microsoft.com/office/drawing/2014/main" xmlns="" id="{E5632C1D-A950-4F3E-9CF5-79F67973BD57}"/>
               </a:ext>
             </a:extLst>
           </p:cNvPr>
@@ -6771,7 +6771,7 @@
           <p:cNvPr id="8" name="직사각형 7">
             <a:extLst>
               <a:ext uri="{FF2B5EF4-FFF2-40B4-BE49-F238E27FC236}">
-                <a16:creationId xmlns="" xmlns:a16="http://schemas.microsoft.com/office/drawing/2014/main" id="{B615726C-6869-4388-A118-E81DFCA274B7}"/>
+                <a16:creationId xmlns:a16="http://schemas.microsoft.com/office/drawing/2014/main" xmlns="" id="{B615726C-6869-4388-A118-E81DFCA274B7}"/>
               </a:ext>
             </a:extLst>
           </p:cNvPr>
@@ -6823,7 +6823,7 @@
           <p:cNvPr id="9" name="이등변 삼각형 8">
             <a:extLst>
               <a:ext uri="{FF2B5EF4-FFF2-40B4-BE49-F238E27FC236}">
-                <a16:creationId xmlns="" xmlns:a16="http://schemas.microsoft.com/office/drawing/2014/main" id="{815C0368-C5D6-48EB-B6A4-E74FB3200E21}"/>
+                <a16:creationId xmlns:a16="http://schemas.microsoft.com/office/drawing/2014/main" xmlns="" id="{815C0368-C5D6-48EB-B6A4-E74FB3200E21}"/>
               </a:ext>
             </a:extLst>
           </p:cNvPr>
@@ -6875,7 +6875,7 @@
           <p:cNvPr id="11" name="TextBox 10">
             <a:extLst>
               <a:ext uri="{FF2B5EF4-FFF2-40B4-BE49-F238E27FC236}">
-                <a16:creationId xmlns="" xmlns:a16="http://schemas.microsoft.com/office/drawing/2014/main" id="{3B56E22C-9C6F-4673-85F6-4053230A68F3}"/>
+                <a16:creationId xmlns:a16="http://schemas.microsoft.com/office/drawing/2014/main" xmlns="" id="{3B56E22C-9C6F-4673-85F6-4053230A68F3}"/>
               </a:ext>
             </a:extLst>
           </p:cNvPr>
@@ -6930,7 +6930,7 @@
           <p:cNvPr id="13" name="TextBox 12">
             <a:extLst>
               <a:ext uri="{FF2B5EF4-FFF2-40B4-BE49-F238E27FC236}">
-                <a16:creationId xmlns="" xmlns:a16="http://schemas.microsoft.com/office/drawing/2014/main" id="{CD962488-19ED-41CA-BE55-C84AEA464E67}"/>
+                <a16:creationId xmlns:a16="http://schemas.microsoft.com/office/drawing/2014/main" xmlns="" id="{CD962488-19ED-41CA-BE55-C84AEA464E67}"/>
               </a:ext>
             </a:extLst>
           </p:cNvPr>
@@ -6984,7 +6984,7 @@
           <p:cNvPr id="14" name="TextBox 13">
             <a:extLst>
               <a:ext uri="{FF2B5EF4-FFF2-40B4-BE49-F238E27FC236}">
-                <a16:creationId xmlns="" xmlns:a16="http://schemas.microsoft.com/office/drawing/2014/main" id="{9829CA03-5C49-493A-9184-CD19C01BA810}"/>
+                <a16:creationId xmlns:a16="http://schemas.microsoft.com/office/drawing/2014/main" xmlns="" id="{9829CA03-5C49-493A-9184-CD19C01BA810}"/>
               </a:ext>
             </a:extLst>
           </p:cNvPr>
@@ -7052,7 +7052,7 @@
           <p:cNvPr id="15" name="TextBox 14">
             <a:extLst>
               <a:ext uri="{FF2B5EF4-FFF2-40B4-BE49-F238E27FC236}">
-                <a16:creationId xmlns="" xmlns:a16="http://schemas.microsoft.com/office/drawing/2014/main" id="{6E6446EF-AB83-44C2-B9CA-9D0721C4F679}"/>
+                <a16:creationId xmlns:a16="http://schemas.microsoft.com/office/drawing/2014/main" xmlns="" id="{6E6446EF-AB83-44C2-B9CA-9D0721C4F679}"/>
               </a:ext>
             </a:extLst>
           </p:cNvPr>
@@ -7120,7 +7120,7 @@
           <p:cNvPr id="16" name="TextBox 15">
             <a:extLst>
               <a:ext uri="{FF2B5EF4-FFF2-40B4-BE49-F238E27FC236}">
-                <a16:creationId xmlns="" xmlns:a16="http://schemas.microsoft.com/office/drawing/2014/main" id="{D429A7D4-B047-4E8E-A115-AA8FB54A4A41}"/>
+                <a16:creationId xmlns:a16="http://schemas.microsoft.com/office/drawing/2014/main" xmlns="" id="{D429A7D4-B047-4E8E-A115-AA8FB54A4A41}"/>
               </a:ext>
             </a:extLst>
           </p:cNvPr>
@@ -7220,7 +7220,7 @@
           <p:cNvPr id="17" name="TextBox 16">
             <a:extLst>
               <a:ext uri="{FF2B5EF4-FFF2-40B4-BE49-F238E27FC236}">
-                <a16:creationId xmlns="" xmlns:a16="http://schemas.microsoft.com/office/drawing/2014/main" id="{9317F9DE-9433-403F-A085-4973414485BB}"/>
+                <a16:creationId xmlns:a16="http://schemas.microsoft.com/office/drawing/2014/main" xmlns="" id="{9317F9DE-9433-403F-A085-4973414485BB}"/>
               </a:ext>
             </a:extLst>
           </p:cNvPr>
@@ -7320,7 +7320,7 @@
           <p:cNvPr id="19" name="TextBox 18">
             <a:extLst>
               <a:ext uri="{FF2B5EF4-FFF2-40B4-BE49-F238E27FC236}">
-                <a16:creationId xmlns="" xmlns:a16="http://schemas.microsoft.com/office/drawing/2014/main" id="{5F52CB00-E71E-439A-BFBC-AC6E5FE50082}"/>
+                <a16:creationId xmlns:a16="http://schemas.microsoft.com/office/drawing/2014/main" xmlns="" id="{5F52CB00-E71E-439A-BFBC-AC6E5FE50082}"/>
               </a:ext>
             </a:extLst>
           </p:cNvPr>
@@ -7390,7 +7390,7 @@
           <p:cNvPr id="20" name="TextBox 19">
             <a:extLst>
               <a:ext uri="{FF2B5EF4-FFF2-40B4-BE49-F238E27FC236}">
-                <a16:creationId xmlns="" xmlns:a16="http://schemas.microsoft.com/office/drawing/2014/main" id="{2851B93F-1693-45E0-A08C-950E3A4B1B43}"/>
+                <a16:creationId xmlns:a16="http://schemas.microsoft.com/office/drawing/2014/main" xmlns="" id="{2851B93F-1693-45E0-A08C-950E3A4B1B43}"/>
               </a:ext>
             </a:extLst>
           </p:cNvPr>
@@ -7519,7 +7519,7 @@
           <p:cNvPr id="21" name="TextBox 20">
             <a:extLst>
               <a:ext uri="{FF2B5EF4-FFF2-40B4-BE49-F238E27FC236}">
-                <a16:creationId xmlns="" xmlns:a16="http://schemas.microsoft.com/office/drawing/2014/main" id="{845A40D2-5824-4F63-AC25-F6555712226A}"/>
+                <a16:creationId xmlns:a16="http://schemas.microsoft.com/office/drawing/2014/main" xmlns="" id="{845A40D2-5824-4F63-AC25-F6555712226A}"/>
               </a:ext>
             </a:extLst>
           </p:cNvPr>
@@ -7573,7 +7573,7 @@
           <p:cNvPr id="22" name="TextBox 21">
             <a:extLst>
               <a:ext uri="{FF2B5EF4-FFF2-40B4-BE49-F238E27FC236}">
-                <a16:creationId xmlns="" xmlns:a16="http://schemas.microsoft.com/office/drawing/2014/main" id="{7827561C-996F-4BF3-8298-ACD34A26C88A}"/>
+                <a16:creationId xmlns:a16="http://schemas.microsoft.com/office/drawing/2014/main" xmlns="" id="{7827561C-996F-4BF3-8298-ACD34A26C88A}"/>
               </a:ext>
             </a:extLst>
           </p:cNvPr>
@@ -7752,7 +7752,7 @@
           <p:cNvPr id="23" name="TextBox 22">
             <a:extLst>
               <a:ext uri="{FF2B5EF4-FFF2-40B4-BE49-F238E27FC236}">
-                <a16:creationId xmlns="" xmlns:a16="http://schemas.microsoft.com/office/drawing/2014/main" id="{2C819643-B386-45B7-B469-884CF16D72D5}"/>
+                <a16:creationId xmlns:a16="http://schemas.microsoft.com/office/drawing/2014/main" xmlns="" id="{2C819643-B386-45B7-B469-884CF16D72D5}"/>
               </a:ext>
             </a:extLst>
           </p:cNvPr>
@@ -8103,7 +8103,7 @@
           <p:cNvPr id="29" name="말풍선: 사각형 28">
             <a:extLst>
               <a:ext uri="{FF2B5EF4-FFF2-40B4-BE49-F238E27FC236}">
-                <a16:creationId xmlns="" xmlns:a16="http://schemas.microsoft.com/office/drawing/2014/main" id="{E438998C-85B2-4F23-B130-2D1B22BFA8A5}"/>
+                <a16:creationId xmlns:a16="http://schemas.microsoft.com/office/drawing/2014/main" xmlns="" id="{E438998C-85B2-4F23-B130-2D1B22BFA8A5}"/>
               </a:ext>
             </a:extLst>
           </p:cNvPr>
@@ -8205,7 +8205,7 @@
           <p:cNvPr id="31" name="직선 연결선 30">
             <a:extLst>
               <a:ext uri="{FF2B5EF4-FFF2-40B4-BE49-F238E27FC236}">
-                <a16:creationId xmlns="" xmlns:a16="http://schemas.microsoft.com/office/drawing/2014/main" id="{4570B967-ACD1-4F60-8FC8-E371F671C0E3}"/>
+                <a16:creationId xmlns:a16="http://schemas.microsoft.com/office/drawing/2014/main" xmlns="" id="{4570B967-ACD1-4F60-8FC8-E371F671C0E3}"/>
               </a:ext>
             </a:extLst>
           </p:cNvPr>
@@ -9057,7 +9057,7 @@
           <p:cNvPr id="4" name="TextBox 3">
             <a:extLst>
               <a:ext uri="{FF2B5EF4-FFF2-40B4-BE49-F238E27FC236}">
-                <a16:creationId xmlns="" xmlns:a16="http://schemas.microsoft.com/office/drawing/2014/main" id="{67E60C02-B855-4362-93EA-778147A51EEB}"/>
+                <a16:creationId xmlns:a16="http://schemas.microsoft.com/office/drawing/2014/main" xmlns="" id="{67E60C02-B855-4362-93EA-778147A51EEB}"/>
               </a:ext>
             </a:extLst>
           </p:cNvPr>
@@ -9121,7 +9121,7 @@
           <p:cNvPr id="6" name="TextBox 5">
             <a:extLst>
               <a:ext uri="{FF2B5EF4-FFF2-40B4-BE49-F238E27FC236}">
-                <a16:creationId xmlns="" xmlns:a16="http://schemas.microsoft.com/office/drawing/2014/main" id="{72C7459D-7345-4C50-957A-BD1C2BCA41F7}"/>
+                <a16:creationId xmlns:a16="http://schemas.microsoft.com/office/drawing/2014/main" xmlns="" id="{72C7459D-7345-4C50-957A-BD1C2BCA41F7}"/>
               </a:ext>
             </a:extLst>
           </p:cNvPr>
@@ -9250,7 +9250,7 @@
           <p:cNvPr id="8" name="TextBox 7">
             <a:extLst>
               <a:ext uri="{FF2B5EF4-FFF2-40B4-BE49-F238E27FC236}">
-                <a16:creationId xmlns="" xmlns:a16="http://schemas.microsoft.com/office/drawing/2014/main" id="{5E055E95-ABD5-4242-8F2D-3EFAECC7547D}"/>
+                <a16:creationId xmlns:a16="http://schemas.microsoft.com/office/drawing/2014/main" xmlns="" id="{5E055E95-ABD5-4242-8F2D-3EFAECC7547D}"/>
               </a:ext>
             </a:extLst>
           </p:cNvPr>
@@ -9410,7 +9410,7 @@
           <p:cNvPr id="10" name="TextBox 9">
             <a:extLst>
               <a:ext uri="{FF2B5EF4-FFF2-40B4-BE49-F238E27FC236}">
-                <a16:creationId xmlns="" xmlns:a16="http://schemas.microsoft.com/office/drawing/2014/main" id="{B11B57CD-C23A-4FDD-90A4-8D90519C1516}"/>
+                <a16:creationId xmlns:a16="http://schemas.microsoft.com/office/drawing/2014/main" xmlns="" id="{B11B57CD-C23A-4FDD-90A4-8D90519C1516}"/>
               </a:ext>
             </a:extLst>
           </p:cNvPr>
@@ -9492,7 +9492,7 @@
           <p:cNvPr id="12" name="TextBox 11">
             <a:extLst>
               <a:ext uri="{FF2B5EF4-FFF2-40B4-BE49-F238E27FC236}">
-                <a16:creationId xmlns="" xmlns:a16="http://schemas.microsoft.com/office/drawing/2014/main" id="{9A65B93F-837A-47B3-97F9-2807B05686A9}"/>
+                <a16:creationId xmlns:a16="http://schemas.microsoft.com/office/drawing/2014/main" xmlns="" id="{9A65B93F-837A-47B3-97F9-2807B05686A9}"/>
               </a:ext>
             </a:extLst>
           </p:cNvPr>
@@ -9642,7 +9642,7 @@
           <p:cNvPr id="14" name="TextBox 13">
             <a:extLst>
               <a:ext uri="{FF2B5EF4-FFF2-40B4-BE49-F238E27FC236}">
-                <a16:creationId xmlns="" xmlns:a16="http://schemas.microsoft.com/office/drawing/2014/main" id="{0C45DF6E-87D8-43EF-9B01-6BB53FDF39A2}"/>
+                <a16:creationId xmlns:a16="http://schemas.microsoft.com/office/drawing/2014/main" xmlns="" id="{0C45DF6E-87D8-43EF-9B01-6BB53FDF39A2}"/>
               </a:ext>
             </a:extLst>
           </p:cNvPr>
@@ -9724,7 +9724,7 @@
           <p:cNvPr id="16" name="TextBox 15">
             <a:extLst>
               <a:ext uri="{FF2B5EF4-FFF2-40B4-BE49-F238E27FC236}">
-                <a16:creationId xmlns="" xmlns:a16="http://schemas.microsoft.com/office/drawing/2014/main" id="{3F4D664A-962F-4157-8C1E-0117D864810B}"/>
+                <a16:creationId xmlns:a16="http://schemas.microsoft.com/office/drawing/2014/main" xmlns="" id="{3F4D664A-962F-4157-8C1E-0117D864810B}"/>
               </a:ext>
             </a:extLst>
           </p:cNvPr>
@@ -9848,7 +9848,7 @@
               <a:t> </a:t>
             </a:r>
             <a:r>
-              <a:rPr lang="ko-KR" altLang="en-US" b="1" dirty="0">
+              <a:rPr lang="ko-KR" altLang="en-US" b="1">
                 <a:solidFill>
                   <a:schemeClr val="bg1"/>
                 </a:solidFill>
@@ -9858,24 +9858,14 @@
               <a:t>계정 </a:t>
             </a:r>
             <a:r>
-              <a:rPr lang="en-US" altLang="ko-KR" b="1" dirty="0" err="1">
+              <a:rPr lang="en-US" altLang="ko-KR" b="1" smtClean="0">
                 <a:solidFill>
                   <a:schemeClr val="bg1"/>
                 </a:solidFill>
                 <a:latin typeface="+mj-lt"/>
                 <a:ea typeface="나눔고딕코딩" panose="020D0009000000000000" pitchFamily="49" charset="-127"/>
               </a:rPr>
-              <a:t>s_member</a:t>
-            </a:r>
-            <a:r>
-              <a:rPr lang="en-US" altLang="ko-KR" b="1" dirty="0">
-                <a:solidFill>
-                  <a:schemeClr val="bg1"/>
-                </a:solidFill>
-                <a:latin typeface="+mj-lt"/>
-                <a:ea typeface="나눔고딕코딩" panose="020D0009000000000000" pitchFamily="49" charset="-127"/>
-              </a:rPr>
-              <a:t> </a:t>
+              <a:t>member </a:t>
             </a:r>
             <a:r>
               <a:rPr lang="ko-KR" altLang="en-US" b="1" dirty="0">
@@ -9905,7 +9895,7 @@
           <p:cNvPr id="18" name="TextBox 17">
             <a:extLst>
               <a:ext uri="{FF2B5EF4-FFF2-40B4-BE49-F238E27FC236}">
-                <a16:creationId xmlns="" xmlns:a16="http://schemas.microsoft.com/office/drawing/2014/main" id="{0A3302A3-E1E2-4234-8F99-15466328A498}"/>
+                <a16:creationId xmlns:a16="http://schemas.microsoft.com/office/drawing/2014/main" xmlns="" id="{0A3302A3-E1E2-4234-8F99-15466328A498}"/>
               </a:ext>
             </a:extLst>
           </p:cNvPr>
@@ -10096,7 +10086,7 @@
           <p:cNvPr id="11" name="그림 10">
             <a:extLst>
               <a:ext uri="{FF2B5EF4-FFF2-40B4-BE49-F238E27FC236}">
-                <a16:creationId xmlns="" xmlns:a16="http://schemas.microsoft.com/office/drawing/2014/main" id="{EDBBC111-56CA-4FDF-9F68-7FE3EE54380D}"/>
+                <a16:creationId xmlns:a16="http://schemas.microsoft.com/office/drawing/2014/main" xmlns="" id="{EDBBC111-56CA-4FDF-9F68-7FE3EE54380D}"/>
               </a:ext>
             </a:extLst>
           </p:cNvPr>
@@ -10126,7 +10116,7 @@
           <p:cNvPr id="3" name="직선 화살표 연결선 2">
             <a:extLst>
               <a:ext uri="{FF2B5EF4-FFF2-40B4-BE49-F238E27FC236}">
-                <a16:creationId xmlns="" xmlns:a16="http://schemas.microsoft.com/office/drawing/2014/main" id="{B2CE7385-BBA8-4A18-AE13-806B12BA52EE}"/>
+                <a16:creationId xmlns:a16="http://schemas.microsoft.com/office/drawing/2014/main" xmlns="" id="{B2CE7385-BBA8-4A18-AE13-806B12BA52EE}"/>
               </a:ext>
             </a:extLst>
           </p:cNvPr>
@@ -10170,7 +10160,7 @@
           <p:cNvPr id="5" name="그림 4">
             <a:extLst>
               <a:ext uri="{FF2B5EF4-FFF2-40B4-BE49-F238E27FC236}">
-                <a16:creationId xmlns="" xmlns:a16="http://schemas.microsoft.com/office/drawing/2014/main" id="{AEB59315-3EA3-467B-8F05-E34329E720AE}"/>
+                <a16:creationId xmlns:a16="http://schemas.microsoft.com/office/drawing/2014/main" xmlns="" id="{AEB59315-3EA3-467B-8F05-E34329E720AE}"/>
               </a:ext>
             </a:extLst>
           </p:cNvPr>
@@ -10200,7 +10190,7 @@
           <p:cNvPr id="7" name="직선 화살표 연결선 6">
             <a:extLst>
               <a:ext uri="{FF2B5EF4-FFF2-40B4-BE49-F238E27FC236}">
-                <a16:creationId xmlns="" xmlns:a16="http://schemas.microsoft.com/office/drawing/2014/main" id="{F0DA9DBD-8713-4714-8524-B934B4309467}"/>
+                <a16:creationId xmlns:a16="http://schemas.microsoft.com/office/drawing/2014/main" xmlns="" id="{F0DA9DBD-8713-4714-8524-B934B4309467}"/>
               </a:ext>
             </a:extLst>
           </p:cNvPr>
@@ -10244,7 +10234,7 @@
           <p:cNvPr id="22" name="연결선: 꺾임 21">
             <a:extLst>
               <a:ext uri="{FF2B5EF4-FFF2-40B4-BE49-F238E27FC236}">
-                <a16:creationId xmlns="" xmlns:a16="http://schemas.microsoft.com/office/drawing/2014/main" id="{9BB67DEF-2B8D-4B44-9605-22E66C1D7C28}"/>
+                <a16:creationId xmlns:a16="http://schemas.microsoft.com/office/drawing/2014/main" xmlns="" id="{9BB67DEF-2B8D-4B44-9605-22E66C1D7C28}"/>
               </a:ext>
             </a:extLst>
           </p:cNvPr>
@@ -10866,7 +10856,7 @@
     </a:clrScheme>
     <a:fontScheme name="Office">
       <a:majorFont>
-        <a:latin typeface="맑은 고딕"/>
+        <a:latin typeface="맑은 고딕" panose="020F0302020204030204"/>
         <a:ea typeface=""/>
         <a:cs typeface=""/>
         <a:font script="Jpan" typeface="游ゴシック Light"/>
@@ -10918,7 +10908,7 @@
         <a:font script="Tfng" typeface="Ebrima"/>
       </a:majorFont>
       <a:minorFont>
-        <a:latin typeface="맑은 고딕"/>
+        <a:latin typeface="맑은 고딕" panose="020F0502020204030204"/>
         <a:ea typeface=""/>
         <a:cs typeface=""/>
         <a:font script="Jpan" typeface="游ゴシック"/>
@@ -11112,7 +11102,7 @@
   <a:extraClrSchemeLst/>
   <a:extLst>
     <a:ext uri="{05A4C25C-085E-4340-85A3-A5531E510DB2}">
-      <thm15:themeFamily xmlns="" xmlns:thm15="http://schemas.microsoft.com/office/thememl/2012/main" name="Office Theme" id="{62F939B6-93AF-4DB8-9C6B-D6C7DFDC589F}" vid="{4A3C46E8-61CC-4603-A589-7422A47A8E4A}"/>
+      <thm15:themeFamily xmlns:thm15="http://schemas.microsoft.com/office/thememl/2012/main" xmlns="" name="Office Theme" id="{62F939B6-93AF-4DB8-9C6B-D6C7DFDC589F}" vid="{4A3C46E8-61CC-4603-A589-7422A47A8E4A}"/>
     </a:ext>
   </a:extLst>
 </a:theme>

</xml_diff>